<commit_message>
adiciona slides e atualiza programa do curso
</commit_message>
<xml_diff>
--- a/sessoes-09-10/sessao-09.pptx
+++ b/sessoes-09-10/sessao-09.pptx
@@ -10765,7 +10765,31 @@
                 <a:cs typeface="Open Sans"/>
                 <a:sym typeface="Open Sans"/>
               </a:rPr>
-              <a:t> - O Desenho das Instituições </a:t>
+              <a:t> - </a:t>
+            </a:r>
+            <a:r>
+              <a:rPr b="1" lang="en-US" sz="4400">
+                <a:solidFill>
+                  <a:srgbClr val="000000"/>
+                </a:solidFill>
+                <a:latin typeface="Open Sans"/>
+                <a:ea typeface="Open Sans"/>
+                <a:cs typeface="Open Sans"/>
+                <a:sym typeface="Open Sans"/>
+              </a:rPr>
+              <a:t>Violência, Democracias e Ditaduras</a:t>
+            </a:r>
+            <a:r>
+              <a:rPr b="1" i="0" lang="en-US" sz="4400" u="none" cap="none" strike="noStrike">
+                <a:solidFill>
+                  <a:srgbClr val="000000"/>
+                </a:solidFill>
+                <a:latin typeface="Open Sans"/>
+                <a:ea typeface="Open Sans"/>
+                <a:cs typeface="Open Sans"/>
+                <a:sym typeface="Open Sans"/>
+              </a:rPr>
+              <a:t> </a:t>
             </a:r>
             <a:endParaRPr b="1">
               <a:latin typeface="Open Sans"/>

</xml_diff>